<commit_message>
Prep work for presentation
Updated the PPT file with newer slides
</commit_message>
<xml_diff>
--- a/SSOPresentation/IAM_SSO.pptx
+++ b/SSOPresentation/IAM_SSO.pptx
@@ -123,6 +123,22 @@
       </a:defRPr>
     </a:lvl9pPr>
   </p:defaultTextStyle>
+  <p:extLst>
+    <p:ext uri="{EFAFB233-063F-42B5-8137-9DF3F51BA10A}">
+      <p15:sldGuideLst xmlns:p15="http://schemas.microsoft.com/office/powerpoint/2012/main" xmlns="">
+        <p15:guide id="1" orient="horz" pos="2160">
+          <p15:clr>
+            <a:srgbClr val="A4A3A4"/>
+          </p15:clr>
+        </p15:guide>
+        <p15:guide id="2" pos="2880">
+          <p15:clr>
+            <a:srgbClr val="A4A3A4"/>
+          </p15:clr>
+        </p15:guide>
+      </p15:sldGuideLst>
+    </p:ext>
+  </p:extLst>
 </p:presentation>
 </file>
 
@@ -374,7 +390,7 @@
           <a:p>
             <a:fld id="{8AE6C55E-4143-49FB-A6C2-6171CD6B66E5}" type="datetimeFigureOut">
               <a:rPr lang="en-US" smtClean="0"/>
-              <a:t>10/22/2015</a:t>
+              <a:t>10/23/2015</a:t>
             </a:fld>
             <a:endParaRPr lang="en-US"/>
           </a:p>
@@ -597,7 +613,7 @@
           <a:p>
             <a:fld id="{8AE6C55E-4143-49FB-A6C2-6171CD6B66E5}" type="datetimeFigureOut">
               <a:rPr lang="en-US" smtClean="0"/>
-              <a:t>10/22/2015</a:t>
+              <a:t>10/23/2015</a:t>
             </a:fld>
             <a:endParaRPr lang="en-US"/>
           </a:p>
@@ -877,7 +893,7 @@
           <a:p>
             <a:fld id="{8AE6C55E-4143-49FB-A6C2-6171CD6B66E5}" type="datetimeFigureOut">
               <a:rPr lang="en-US" smtClean="0"/>
-              <a:t>10/22/2015</a:t>
+              <a:t>10/23/2015</a:t>
             </a:fld>
             <a:endParaRPr lang="en-US"/>
           </a:p>
@@ -1056,7 +1072,7 @@
           <a:p>
             <a:fld id="{8AE6C55E-4143-49FB-A6C2-6171CD6B66E5}" type="datetimeFigureOut">
               <a:rPr lang="en-US" smtClean="0"/>
-              <a:t>10/22/2015</a:t>
+              <a:t>10/23/2015</a:t>
             </a:fld>
             <a:endParaRPr lang="en-US"/>
           </a:p>
@@ -1414,7 +1430,7 @@
           <a:p>
             <a:fld id="{8AE6C55E-4143-49FB-A6C2-6171CD6B66E5}" type="datetimeFigureOut">
               <a:rPr lang="en-US" smtClean="0"/>
-              <a:t>10/22/2015</a:t>
+              <a:t>10/23/2015</a:t>
             </a:fld>
             <a:endParaRPr lang="en-US"/>
           </a:p>
@@ -1701,7 +1717,7 @@
           <a:p>
             <a:fld id="{8AE6C55E-4143-49FB-A6C2-6171CD6B66E5}" type="datetimeFigureOut">
               <a:rPr lang="en-US" smtClean="0"/>
-              <a:t>10/22/2015</a:t>
+              <a:t>10/23/2015</a:t>
             </a:fld>
             <a:endParaRPr lang="en-US"/>
           </a:p>
@@ -2123,7 +2139,7 @@
           <a:p>
             <a:fld id="{8AE6C55E-4143-49FB-A6C2-6171CD6B66E5}" type="datetimeFigureOut">
               <a:rPr lang="en-US" smtClean="0"/>
-              <a:t>10/22/2015</a:t>
+              <a:t>10/23/2015</a:t>
             </a:fld>
             <a:endParaRPr lang="en-US"/>
           </a:p>
@@ -2238,7 +2254,7 @@
           <a:p>
             <a:fld id="{8AE6C55E-4143-49FB-A6C2-6171CD6B66E5}" type="datetimeFigureOut">
               <a:rPr lang="en-US" smtClean="0"/>
-              <a:t>10/22/2015</a:t>
+              <a:t>10/23/2015</a:t>
             </a:fld>
             <a:endParaRPr lang="en-US"/>
           </a:p>
@@ -2328,7 +2344,7 @@
           <a:p>
             <a:fld id="{8AE6C55E-4143-49FB-A6C2-6171CD6B66E5}" type="datetimeFigureOut">
               <a:rPr lang="en-US" smtClean="0"/>
-              <a:t>10/22/2015</a:t>
+              <a:t>10/23/2015</a:t>
             </a:fld>
             <a:endParaRPr lang="en-US"/>
           </a:p>
@@ -2606,7 +2622,7 @@
           <a:p>
             <a:fld id="{8AE6C55E-4143-49FB-A6C2-6171CD6B66E5}" type="datetimeFigureOut">
               <a:rPr lang="en-US" smtClean="0"/>
-              <a:t>10/22/2015</a:t>
+              <a:t>10/23/2015</a:t>
             </a:fld>
             <a:endParaRPr lang="en-US"/>
           </a:p>
@@ -2972,7 +2988,7 @@
           <a:p>
             <a:fld id="{8AE6C55E-4143-49FB-A6C2-6171CD6B66E5}" type="datetimeFigureOut">
               <a:rPr lang="en-US" smtClean="0"/>
-              <a:t>10/22/2015</a:t>
+              <a:t>10/23/2015</a:t>
             </a:fld>
             <a:endParaRPr lang="en-US"/>
           </a:p>
@@ -3409,7 +3425,7 @@
           <a:p>
             <a:fld id="{8AE6C55E-4143-49FB-A6C2-6171CD6B66E5}" type="datetimeFigureOut">
               <a:rPr lang="en-US" smtClean="0"/>
-              <a:t>10/22/2015</a:t>
+              <a:t>10/23/2015</a:t>
             </a:fld>
             <a:endParaRPr lang="en-US"/>
           </a:p>
@@ -4917,32 +4933,35 @@
           </a:p>
         </p:txBody>
       </p:sp>
-      <p:sp>
-        <p:nvSpPr>
-          <p:cNvPr id="3" name="Content Placeholder 2"/>
-          <p:cNvSpPr>
-            <a:spLocks noGrp="1"/>
-          </p:cNvSpPr>
+      <p:pic>
+        <p:nvPicPr>
+          <p:cNvPr id="5" name="Content Placeholder 4"/>
+          <p:cNvPicPr>
+            <a:picLocks noGrp="1" noChangeAspect="1"/>
+          </p:cNvPicPr>
           <p:nvPr>
             <p:ph idx="1"/>
           </p:nvPr>
-        </p:nvSpPr>
-        <p:spPr/>
-        <p:txBody>
-          <a:bodyPr/>
-          <a:lstStyle/>
-          <a:p>
-            <a:r>
-              <a:rPr lang="en-US" dirty="0" err="1" smtClean="0"/>
-              <a:t>Licecap</a:t>
-            </a:r>
-            <a:r>
-              <a:rPr lang="en-US" dirty="0" smtClean="0"/>
-              <a:t> capture of MVC (server-side) app</a:t>
-            </a:r>
-          </a:p>
-        </p:txBody>
-      </p:sp>
+        </p:nvPicPr>
+        <p:blipFill>
+          <a:blip r:embed="rId2">
+            <a:extLst>
+              <a:ext uri="{28A0092B-C50C-407E-A947-70E740481C1C}">
+                <a14:useLocalDpi xmlns:a14="http://schemas.microsoft.com/office/drawing/2010/main" val="0"/>
+              </a:ext>
+            </a:extLst>
+          </a:blip>
+          <a:stretch>
+            <a:fillRect/>
+          </a:stretch>
+        </p:blipFill>
+        <p:spPr>
+          <a:xfrm>
+            <a:off x="528576" y="1774825"/>
+            <a:ext cx="8086847" cy="4625975"/>
+          </a:xfrm>
+        </p:spPr>
+      </p:pic>
     </p:spTree>
     <p:extLst>
       <p:ext uri="{BB962C8B-B14F-4D97-AF65-F5344CB8AC3E}">
@@ -5005,40 +5024,35 @@
           </a:p>
         </p:txBody>
       </p:sp>
-      <p:sp>
-        <p:nvSpPr>
-          <p:cNvPr id="3" name="Content Placeholder 2"/>
-          <p:cNvSpPr>
-            <a:spLocks noGrp="1"/>
-          </p:cNvSpPr>
+      <p:pic>
+        <p:nvPicPr>
+          <p:cNvPr id="5" name="Content Placeholder 4"/>
+          <p:cNvPicPr>
+            <a:picLocks noGrp="1" noChangeAspect="1"/>
+          </p:cNvPicPr>
           <p:nvPr>
             <p:ph idx="1"/>
           </p:nvPr>
-        </p:nvSpPr>
-        <p:spPr/>
-        <p:txBody>
-          <a:bodyPr/>
-          <a:lstStyle/>
-          <a:p>
-            <a:r>
-              <a:rPr lang="en-US" dirty="0" err="1" smtClean="0"/>
-              <a:t>Licecap</a:t>
-            </a:r>
-            <a:r>
-              <a:rPr lang="en-US" dirty="0" smtClean="0"/>
-              <a:t> capture of </a:t>
-            </a:r>
-            <a:r>
-              <a:rPr lang="en-US" dirty="0" err="1" smtClean="0"/>
-              <a:t>ExtJS</a:t>
-            </a:r>
-            <a:r>
-              <a:rPr lang="en-US" dirty="0" smtClean="0"/>
-              <a:t> (client-side) app</a:t>
-            </a:r>
-          </a:p>
-        </p:txBody>
-      </p:sp>
+        </p:nvPicPr>
+        <p:blipFill>
+          <a:blip r:embed="rId2">
+            <a:extLst>
+              <a:ext uri="{28A0092B-C50C-407E-A947-70E740481C1C}">
+                <a14:useLocalDpi xmlns:a14="http://schemas.microsoft.com/office/drawing/2010/main" val="0"/>
+              </a:ext>
+            </a:extLst>
+          </a:blip>
+          <a:stretch>
+            <a:fillRect/>
+          </a:stretch>
+        </p:blipFill>
+        <p:spPr>
+          <a:xfrm>
+            <a:off x="457200" y="1882934"/>
+            <a:ext cx="8229600" cy="4409757"/>
+          </a:xfrm>
+        </p:spPr>
+      </p:pic>
     </p:spTree>
     <p:extLst>
       <p:ext uri="{BB962C8B-B14F-4D97-AF65-F5344CB8AC3E}">
@@ -5340,7 +5354,7 @@
         <p:spPr/>
         <p:txBody>
           <a:bodyPr>
-            <a:normAutofit lnSpcReduction="10000"/>
+            <a:normAutofit/>
           </a:bodyPr>
           <a:lstStyle/>
           <a:p>
@@ -5359,13 +5373,8 @@
           <a:p>
             <a:r>
               <a:rPr lang="en-US" dirty="0" smtClean="0"/>
-              <a:t>Sunil </a:t>
-            </a:r>
-            <a:r>
-              <a:rPr lang="en-US" dirty="0" err="1" smtClean="0"/>
-              <a:t>Ayyappankuty</a:t>
-            </a:r>
-            <a:endParaRPr lang="en-US" dirty="0" smtClean="0"/>
+              <a:t>Sunil Ayyappankutty</a:t>
+            </a:r>
           </a:p>
           <a:p>
             <a:pPr lvl="1"/>
@@ -5373,6 +5382,22 @@
               <a:rPr lang="en-US" dirty="0" smtClean="0"/>
               <a:t>LinkedIn: </a:t>
             </a:r>
+            <a:r>
+              <a:rPr lang="en-US" dirty="0">
+                <a:hlinkClick r:id="rId2"/>
+              </a:rPr>
+              <a:t>https://</a:t>
+            </a:r>
+            <a:r>
+              <a:rPr lang="en-US" dirty="0" smtClean="0">
+                <a:hlinkClick r:id="rId2"/>
+              </a:rPr>
+              <a:t>www.linkedin.com/in/sunilkutty</a:t>
+            </a:r>
+            <a:r>
+              <a:rPr lang="en-US" dirty="0" smtClean="0"/>
+              <a:t> </a:t>
+            </a:r>
           </a:p>
           <a:p>
             <a:r>
@@ -5384,8 +5409,17 @@
             <a:pPr lvl="1"/>
             <a:r>
               <a:rPr lang="en-US" dirty="0" smtClean="0"/>
-              <a:t>LinkedIn:</a:t>
-            </a:r>
+              <a:t>LinkedIn</a:t>
+            </a:r>
+            <a:r>
+              <a:rPr lang="en-US" dirty="0" smtClean="0"/>
+              <a:t>: </a:t>
+            </a:r>
+            <a:r>
+              <a:rPr lang="en-US" sz="2000" dirty="0"/>
+              <a:t>https://www.linkedin.com/in/anibalvelarde</a:t>
+            </a:r>
+            <a:endParaRPr lang="en-US" sz="2000" dirty="0" smtClean="0"/>
           </a:p>
           <a:p>
             <a:r>
@@ -5396,25 +5430,18 @@
           <a:p>
             <a:pPr lvl="1"/>
             <a:r>
-              <a:rPr lang="en-US" dirty="0" err="1" smtClean="0"/>
-              <a:t>SlideShare</a:t>
-            </a:r>
-            <a:r>
-              <a:rPr lang="en-US" dirty="0" smtClean="0"/>
-              <a:t>: &lt;URL&gt;</a:t>
-            </a:r>
-          </a:p>
-          <a:p>
-            <a:pPr lvl="1"/>
-            <a:r>
-              <a:rPr lang="en-US" dirty="0" err="1" smtClean="0"/>
+              <a:rPr lang="en-US" smtClean="0"/>
               <a:t>GitHub</a:t>
             </a:r>
             <a:r>
               <a:rPr lang="en-US" dirty="0" smtClean="0"/>
-              <a:t>: &lt;URL&gt;</a:t>
-            </a:r>
-            <a:endParaRPr lang="en-US" dirty="0"/>
+              <a:t>: </a:t>
+            </a:r>
+            <a:r>
+              <a:rPr lang="en-US" sz="2400" dirty="0"/>
+              <a:t>https://github.com/anibalvelarde/SSOExample</a:t>
+            </a:r>
+            <a:endParaRPr lang="en-US" sz="2400" dirty="0"/>
           </a:p>
         </p:txBody>
       </p:sp>

</xml_diff>